<commit_message>
Added QR Code for GitHub repo
</commit_message>
<xml_diff>
--- a/Aoibhe_Turner_Heaney_Algorithm_Challenge_Presentation.pptx
+++ b/Aoibhe_Turner_Heaney_Algorithm_Challenge_Presentation.pptx
@@ -4004,7 +4004,12 @@
             <p:ph type="ctrTitle"/>
           </p:nvPr>
         </p:nvSpPr>
-        <p:spPr/>
+        <p:spPr>
+          <a:xfrm>
+            <a:off x="1524000" y="731838"/>
+            <a:ext cx="9144000" cy="2387600"/>
+          </a:xfrm>
+        </p:spPr>
         <p:txBody>
           <a:bodyPr>
             <a:normAutofit/>
@@ -4044,7 +4049,7 @@
         </p:nvSpPr>
         <p:spPr>
           <a:xfrm>
-            <a:off x="1524000" y="4369776"/>
+            <a:off x="1524000" y="3579202"/>
             <a:ext cx="9144000" cy="888023"/>
           </a:xfrm>
         </p:spPr>
@@ -4080,6 +4085,42 @@
           </a:p>
         </p:txBody>
       </p:sp>
+      <p:pic>
+        <p:nvPicPr>
+          <p:cNvPr id="5" name="Picture 4" descr="Qr code&#10;&#10;Description automatically generated">
+            <a:extLst>
+              <a:ext uri="{FF2B5EF4-FFF2-40B4-BE49-F238E27FC236}">
+                <a16:creationId xmlns:a16="http://schemas.microsoft.com/office/drawing/2014/main" id="{D426ACA8-8D01-552F-99E1-342897CBBAC6}"/>
+              </a:ext>
+            </a:extLst>
+          </p:cNvPr>
+          <p:cNvPicPr>
+            <a:picLocks noChangeAspect="1"/>
+          </p:cNvPicPr>
+          <p:nvPr/>
+        </p:nvPicPr>
+        <p:blipFill>
+          <a:blip r:embed="rId3">
+            <a:extLst>
+              <a:ext uri="{28A0092B-C50C-407E-A947-70E740481C1C}">
+                <a14:useLocalDpi xmlns:a14="http://schemas.microsoft.com/office/drawing/2010/main" val="0"/>
+              </a:ext>
+            </a:extLst>
+          </a:blip>
+          <a:stretch>
+            <a:fillRect/>
+          </a:stretch>
+        </p:blipFill>
+        <p:spPr>
+          <a:xfrm>
+            <a:off x="5095875" y="4686300"/>
+            <a:ext cx="2000250" cy="2000250"/>
+          </a:xfrm>
+          <a:prstGeom prst="rect">
+            <a:avLst/>
+          </a:prstGeom>
+        </p:spPr>
+      </p:pic>
     </p:spTree>
     <p:extLst>
       <p:ext uri="{BB962C8B-B14F-4D97-AF65-F5344CB8AC3E}">

</xml_diff>